<commit_message>
Upload solutions and update files
</commit_message>
<xml_diff>
--- a/Lessons/2022/2022_06_16_manipulating_tables/2022_06_16_manipulating_tables.pptx
+++ b/Lessons/2022/2022_06_16_manipulating_tables/2022_06_16_manipulating_tables.pptx
@@ -301,7 +301,7 @@
           <a:lstStyle/>
           <a:p>
             <a:fld id="{1160EA64-D806-43AC-9DF2-F8C432F32B4C}" type="datetimeFigureOut">
-              <a:rPr lang="en-US" dirty="0"/>
+              <a:rPr lang="en-US"/>
               <a:t>6/16/22</a:t>
             </a:fld>
             <a:endParaRPr lang="en-US" dirty="0"/>
@@ -343,7 +343,7 @@
           <a:lstStyle/>
           <a:p>
             <a:fld id="{8A7A6979-0714-4377-B894-6BE4C2D6E202}" type="slidenum">
-              <a:rPr lang="en-US" dirty="0"/>
+              <a:rPr lang="en-US"/>
               <a:pPr/>
               <a:t>‹#›</a:t>
             </a:fld>
@@ -467,7 +467,7 @@
           <a:lstStyle/>
           <a:p>
             <a:fld id="{E9F9C37B-1D36-470B-8223-D6C91242EC14}" type="datetimeFigureOut">
-              <a:rPr lang="en-US" dirty="0"/>
+              <a:rPr lang="en-US"/>
               <a:t>6/16/22</a:t>
             </a:fld>
             <a:endParaRPr lang="en-US" dirty="0"/>
@@ -509,7 +509,7 @@
           <a:lstStyle/>
           <a:p>
             <a:fld id="{8A7A6979-0714-4377-B894-6BE4C2D6E202}" type="slidenum">
-              <a:rPr lang="en-US" dirty="0"/>
+              <a:rPr lang="en-US"/>
               <a:t>‹#›</a:t>
             </a:fld>
             <a:endParaRPr lang="en-US" dirty="0"/>
@@ -642,7 +642,7 @@
           <a:lstStyle/>
           <a:p>
             <a:fld id="{67C6F52A-A82B-47A2-A83A-8C4C91F2D59F}" type="datetimeFigureOut">
-              <a:rPr lang="en-US" dirty="0"/>
+              <a:rPr lang="en-US"/>
               <a:t>6/16/22</a:t>
             </a:fld>
             <a:endParaRPr lang="en-US" dirty="0"/>
@@ -684,7 +684,7 @@
           <a:lstStyle/>
           <a:p>
             <a:fld id="{8A7A6979-0714-4377-B894-6BE4C2D6E202}" type="slidenum">
-              <a:rPr lang="en-US" dirty="0"/>
+              <a:rPr lang="en-US"/>
               <a:t>‹#›</a:t>
             </a:fld>
             <a:endParaRPr lang="en-US" dirty="0"/>
@@ -807,7 +807,7 @@
           <a:lstStyle/>
           <a:p>
             <a:fld id="{F070A7B3-6521-4DCA-87E5-044747A908C1}" type="datetimeFigureOut">
-              <a:rPr lang="en-US" dirty="0"/>
+              <a:rPr lang="en-US"/>
               <a:t>6/16/22</a:t>
             </a:fld>
             <a:endParaRPr lang="en-US" dirty="0"/>
@@ -849,7 +849,7 @@
           <a:lstStyle/>
           <a:p>
             <a:fld id="{8A7A6979-0714-4377-B894-6BE4C2D6E202}" type="slidenum">
-              <a:rPr lang="en-US" dirty="0"/>
+              <a:rPr lang="en-US"/>
               <a:pPr/>
               <a:t>‹#›</a:t>
             </a:fld>
@@ -1071,7 +1071,7 @@
           <a:lstStyle/>
           <a:p>
             <a:fld id="{1160EA64-D806-43AC-9DF2-F8C432F32B4C}" type="datetimeFigureOut">
-              <a:rPr lang="en-US" dirty="0"/>
+              <a:rPr lang="en-US"/>
               <a:t>6/16/22</a:t>
             </a:fld>
             <a:endParaRPr lang="en-US" dirty="0"/>
@@ -1113,7 +1113,7 @@
           <a:lstStyle/>
           <a:p>
             <a:fld id="{8A7A6979-0714-4377-B894-6BE4C2D6E202}" type="slidenum">
-              <a:rPr lang="en-US" dirty="0"/>
+              <a:rPr lang="en-US"/>
               <a:pPr/>
               <a:t>‹#›</a:t>
             </a:fld>
@@ -1299,7 +1299,7 @@
           <a:lstStyle/>
           <a:p>
             <a:fld id="{AB134690-1557-4C89-A502-4959FE7FAD70}" type="datetimeFigureOut">
-              <a:rPr lang="en-US" dirty="0"/>
+              <a:rPr lang="en-US"/>
               <a:t>6/16/22</a:t>
             </a:fld>
             <a:endParaRPr lang="en-US" dirty="0"/>
@@ -1341,7 +1341,7 @@
           <a:lstStyle/>
           <a:p>
             <a:fld id="{8A7A6979-0714-4377-B894-6BE4C2D6E202}" type="slidenum">
-              <a:rPr lang="en-US" dirty="0"/>
+              <a:rPr lang="en-US"/>
               <a:t>‹#›</a:t>
             </a:fld>
             <a:endParaRPr lang="en-US" dirty="0"/>
@@ -1653,7 +1653,7 @@
           <a:lstStyle/>
           <a:p>
             <a:fld id="{4F7D4976-E339-4826-83B7-FBD03F55ECF8}" type="datetimeFigureOut">
-              <a:rPr lang="en-US" dirty="0"/>
+              <a:rPr lang="en-US"/>
               <a:t>6/16/22</a:t>
             </a:fld>
             <a:endParaRPr lang="en-US" dirty="0"/>
@@ -1695,7 +1695,7 @@
           <a:lstStyle/>
           <a:p>
             <a:fld id="{8A7A6979-0714-4377-B894-6BE4C2D6E202}" type="slidenum">
-              <a:rPr lang="en-US" dirty="0"/>
+              <a:rPr lang="en-US"/>
               <a:t>‹#›</a:t>
             </a:fld>
             <a:endParaRPr lang="en-US" dirty="0"/>
@@ -1789,7 +1789,7 @@
           <a:lstStyle/>
           <a:p>
             <a:fld id="{E1037C31-9E7A-4F99-8774-A0E530DE1A42}" type="datetimeFigureOut">
-              <a:rPr lang="en-US" dirty="0"/>
+              <a:rPr lang="en-US"/>
               <a:t>6/16/22</a:t>
             </a:fld>
             <a:endParaRPr lang="en-US" dirty="0"/>
@@ -1831,7 +1831,7 @@
           <a:lstStyle/>
           <a:p>
             <a:fld id="{8A7A6979-0714-4377-B894-6BE4C2D6E202}" type="slidenum">
-              <a:rPr lang="en-US" dirty="0"/>
+              <a:rPr lang="en-US"/>
               <a:t>‹#›</a:t>
             </a:fld>
             <a:endParaRPr lang="en-US" dirty="0"/>
@@ -1879,7 +1879,7 @@
           <a:lstStyle/>
           <a:p>
             <a:fld id="{C278504F-A551-4DE0-9316-4DCD1D8CC752}" type="datetimeFigureOut">
-              <a:rPr lang="en-US" dirty="0"/>
+              <a:rPr lang="en-US"/>
               <a:t>6/16/22</a:t>
             </a:fld>
             <a:endParaRPr lang="en-US" dirty="0"/>
@@ -1921,7 +1921,7 @@
           <a:lstStyle/>
           <a:p>
             <a:fld id="{8A7A6979-0714-4377-B894-6BE4C2D6E202}" type="slidenum">
-              <a:rPr lang="en-US" dirty="0"/>
+              <a:rPr lang="en-US"/>
               <a:t>‹#›</a:t>
             </a:fld>
             <a:endParaRPr lang="en-US" dirty="0"/>
@@ -2231,7 +2231,7 @@
           <a:lstStyle/>
           <a:p>
             <a:fld id="{D1BE4249-C0D0-4B06-8692-E8BB871AF643}" type="datetimeFigureOut">
-              <a:rPr lang="en-US" dirty="0"/>
+              <a:rPr lang="en-US"/>
               <a:t>6/16/22</a:t>
             </a:fld>
             <a:endParaRPr lang="en-US" dirty="0"/>
@@ -2288,7 +2288,7 @@
           <a:lstStyle/>
           <a:p>
             <a:fld id="{8A7A6979-0714-4377-B894-6BE4C2D6E202}" type="slidenum">
-              <a:rPr lang="en-US" dirty="0"/>
+              <a:rPr lang="en-US"/>
               <a:t>‹#›</a:t>
             </a:fld>
             <a:endParaRPr lang="en-US" dirty="0"/>
@@ -2474,7 +2474,7 @@
           </a:lstStyle>
           <a:p>
             <a:r>
-              <a:rPr lang="en-GB"/>
+              <a:rPr lang="en-GB" dirty="0"/>
               <a:t>Click icon to add picture</a:t>
             </a:r>
             <a:endParaRPr lang="en-US" dirty="0"/>
@@ -2583,7 +2583,7 @@
           </a:lstStyle>
           <a:p>
             <a:fld id="{042B0DB6-F5C7-45FB-8CF3-31B45F9C2DAC}" type="datetimeFigureOut">
-              <a:rPr lang="en-US" dirty="0"/>
+              <a:rPr lang="en-US"/>
               <a:t>6/16/22</a:t>
             </a:fld>
             <a:endParaRPr lang="en-US" dirty="0"/>
@@ -2640,7 +2640,7 @@
           <a:lstStyle/>
           <a:p>
             <a:fld id="{8A7A6979-0714-4377-B894-6BE4C2D6E202}" type="slidenum">
-              <a:rPr lang="en-US" dirty="0"/>
+              <a:rPr lang="en-US"/>
               <a:t>‹#›</a:t>
             </a:fld>
             <a:endParaRPr lang="en-US" dirty="0"/>
@@ -2820,7 +2820,7 @@
           </a:lstStyle>
           <a:p>
             <a:fld id="{1160EA64-D806-43AC-9DF2-F8C432F32B4C}" type="datetimeFigureOut">
-              <a:rPr lang="en-US" dirty="0"/>
+              <a:rPr lang="en-US"/>
               <a:t>6/16/22</a:t>
             </a:fld>
             <a:endParaRPr lang="en-US" dirty="0"/>
@@ -2903,7 +2903,7 @@
           </a:lstStyle>
           <a:p>
             <a:fld id="{8A7A6979-0714-4377-B894-6BE4C2D6E202}" type="slidenum">
-              <a:rPr lang="en-US" dirty="0"/>
+              <a:rPr lang="en-US"/>
               <a:pPr/>
               <a:t>‹#›</a:t>
             </a:fld>
@@ -3441,16 +3441,10 @@
               </a:lnSpc>
             </a:pPr>
             <a:r>
-              <a:rPr lang="en-AU" sz="2800" b="1" dirty="0" err="1">
-                <a:latin typeface="Courier" pitchFamily="2" charset="0"/>
-              </a:rPr>
-              <a:t>setdiff</a:t>
-            </a:r>
-            <a:r>
               <a:rPr lang="en-AU" sz="2800" b="1" dirty="0">
                 <a:latin typeface="Courier" pitchFamily="2" charset="0"/>
               </a:rPr>
-              <a:t>(x, y)– </a:t>
+              <a:t>setdiff(x, y)– </a:t>
             </a:r>
             <a:r>
               <a:rPr lang="en-AU" sz="2800" dirty="0"/>
@@ -3481,16 +3475,10 @@
               </a:lnSpc>
             </a:pPr>
             <a:r>
-              <a:rPr lang="en-AU" sz="2800" b="1" dirty="0" err="1">
-                <a:latin typeface="Courier" pitchFamily="2" charset="0"/>
-              </a:rPr>
-              <a:t>setequal</a:t>
-            </a:r>
-            <a:r>
               <a:rPr lang="en-AU" sz="2800" b="1" dirty="0">
                 <a:latin typeface="Courier" pitchFamily="2" charset="0"/>
               </a:rPr>
-              <a:t>(x, y)– </a:t>
+              <a:t>setequal(x, y)– </a:t>
             </a:r>
             <a:r>
               <a:rPr lang="en-AU" sz="2800" dirty="0"/>
@@ -3604,7 +3592,7 @@
           <a:lstStyle/>
           <a:p>
             <a:pPr algn="ctr"/>
-            <a:endParaRPr lang="en-AU"/>
+            <a:endParaRPr lang="en-AU" dirty="0"/>
           </a:p>
         </p:txBody>
       </p:sp>
@@ -3717,16 +3705,10 @@
               </a:lnSpc>
             </a:pPr>
             <a:r>
-              <a:rPr lang="en-AU" sz="2800" b="1" dirty="0" err="1">
-                <a:latin typeface="Courier" pitchFamily="2" charset="0"/>
-              </a:rPr>
-              <a:t>setdiff</a:t>
-            </a:r>
-            <a:r>
               <a:rPr lang="en-AU" sz="2800" b="1" dirty="0">
                 <a:latin typeface="Courier" pitchFamily="2" charset="0"/>
               </a:rPr>
-              <a:t>(x, y)– </a:t>
+              <a:t>setdiff(x, y)– </a:t>
             </a:r>
             <a:r>
               <a:rPr lang="en-AU" sz="2800" dirty="0"/>
@@ -3757,16 +3739,10 @@
               </a:lnSpc>
             </a:pPr>
             <a:r>
-              <a:rPr lang="en-AU" sz="2800" b="1" dirty="0" err="1">
-                <a:latin typeface="Courier" pitchFamily="2" charset="0"/>
-              </a:rPr>
-              <a:t>setequal</a:t>
-            </a:r>
-            <a:r>
               <a:rPr lang="en-AU" sz="2800" b="1" dirty="0">
                 <a:latin typeface="Courier" pitchFamily="2" charset="0"/>
               </a:rPr>
-              <a:t>(x, y)– </a:t>
+              <a:t>setequal(x, y)– </a:t>
             </a:r>
             <a:r>
               <a:rPr lang="en-AU" sz="2800" dirty="0"/>
@@ -3880,7 +3856,7 @@
           <a:lstStyle/>
           <a:p>
             <a:pPr algn="ctr"/>
-            <a:endParaRPr lang="en-AU"/>
+            <a:endParaRPr lang="en-AU" dirty="0"/>
           </a:p>
         </p:txBody>
       </p:sp>
@@ -3993,16 +3969,10 @@
               </a:lnSpc>
             </a:pPr>
             <a:r>
-              <a:rPr lang="en-AU" sz="2800" b="1" dirty="0" err="1">
-                <a:latin typeface="Courier" pitchFamily="2" charset="0"/>
-              </a:rPr>
-              <a:t>setdiff</a:t>
-            </a:r>
-            <a:r>
               <a:rPr lang="en-AU" sz="2800" b="1" dirty="0">
                 <a:latin typeface="Courier" pitchFamily="2" charset="0"/>
               </a:rPr>
-              <a:t>(x, y)– </a:t>
+              <a:t>setdiff(x, y)– </a:t>
             </a:r>
             <a:r>
               <a:rPr lang="en-AU" sz="2800" dirty="0"/>
@@ -4033,16 +4003,10 @@
               </a:lnSpc>
             </a:pPr>
             <a:r>
-              <a:rPr lang="en-AU" sz="2800" b="1" dirty="0" err="1">
-                <a:latin typeface="Courier" pitchFamily="2" charset="0"/>
-              </a:rPr>
-              <a:t>setequal</a:t>
-            </a:r>
-            <a:r>
               <a:rPr lang="en-AU" sz="2800" b="1" dirty="0">
                 <a:latin typeface="Courier" pitchFamily="2" charset="0"/>
               </a:rPr>
-              <a:t>(x, y)– </a:t>
+              <a:t>setequal(x, y)– </a:t>
             </a:r>
             <a:r>
               <a:rPr lang="en-AU" sz="2800" dirty="0"/>
@@ -4156,7 +4120,7 @@
           <a:lstStyle/>
           <a:p>
             <a:pPr algn="ctr"/>
-            <a:endParaRPr lang="en-AU"/>
+            <a:endParaRPr lang="en-AU" dirty="0"/>
           </a:p>
         </p:txBody>
       </p:sp>
@@ -4269,16 +4233,10 @@
               </a:lnSpc>
             </a:pPr>
             <a:r>
-              <a:rPr lang="en-AU" sz="2800" b="1" dirty="0" err="1">
-                <a:latin typeface="Courier" pitchFamily="2" charset="0"/>
-              </a:rPr>
-              <a:t>setdiff</a:t>
-            </a:r>
-            <a:r>
               <a:rPr lang="en-AU" sz="2800" b="1" dirty="0">
                 <a:latin typeface="Courier" pitchFamily="2" charset="0"/>
               </a:rPr>
-              <a:t>(x, y)– </a:t>
+              <a:t>setdiff(x, y)– </a:t>
             </a:r>
             <a:r>
               <a:rPr lang="en-AU" sz="2800" dirty="0"/>
@@ -4309,26 +4267,15 @@
               </a:lnSpc>
             </a:pPr>
             <a:r>
-              <a:rPr lang="en-AU" sz="2800" b="1" dirty="0" err="1">
-                <a:latin typeface="Courier" pitchFamily="2" charset="0"/>
-              </a:rPr>
-              <a:t>setequal</a:t>
-            </a:r>
-            <a:r>
               <a:rPr lang="en-AU" sz="2800" b="1" dirty="0">
                 <a:latin typeface="Courier" pitchFamily="2" charset="0"/>
               </a:rPr>
-              <a:t>(x, y)– </a:t>
+              <a:t>setequal(x, y)– </a:t>
             </a:r>
             <a:r>
               <a:rPr lang="en-AU" sz="2800" dirty="0"/>
-              <a:t>to test if two data set have the same rows in any </a:t>
-            </a:r>
-            <a:r>
-              <a:rPr lang="en-AU" sz="2800"/>
-              <a:t>order.</a:t>
-            </a:r>
-            <a:endParaRPr lang="en-AU" sz="2800" dirty="0"/>
+              <a:t>to test if two data set have the same rows in any order.</a:t>
+            </a:r>
           </a:p>
           <a:p>
             <a:pPr>
@@ -4610,7 +4557,7 @@
           <a:lstStyle/>
           <a:p>
             <a:pPr algn="ctr"/>
-            <a:endParaRPr lang="en-AU"/>
+            <a:endParaRPr lang="en-AU" dirty="0"/>
           </a:p>
         </p:txBody>
       </p:sp>
@@ -4949,30 +4896,21 @@
               <a:t>How to check joins with </a:t>
             </a:r>
             <a:r>
-              <a:rPr lang="en-AU" sz="2400" dirty="0" err="1">
-                <a:latin typeface="Courier" pitchFamily="2" charset="0"/>
-              </a:rPr>
-              <a:t>semi_join</a:t>
-            </a:r>
-            <a:r>
               <a:rPr lang="en-AU" sz="2400" dirty="0">
                 <a:latin typeface="Courier" pitchFamily="2" charset="0"/>
               </a:rPr>
-              <a:t> </a:t>
+              <a:t>semi_join </a:t>
             </a:r>
             <a:r>
               <a:rPr lang="en-AU" sz="2400" dirty="0"/>
               <a:t>and </a:t>
             </a:r>
             <a:r>
-              <a:rPr lang="en-AU" sz="2400" dirty="0" err="1">
+              <a:rPr lang="en-AU" sz="2400" dirty="0">
                 <a:latin typeface="Courier" pitchFamily="2" charset="0"/>
               </a:rPr>
               <a:t>anti_join</a:t>
             </a:r>
-            <a:endParaRPr lang="en-AU" sz="2400" dirty="0">
-              <a:latin typeface="Courier" pitchFamily="2" charset="0"/>
-            </a:endParaRPr>
           </a:p>
           <a:p>
             <a:pPr>
@@ -4988,19 +4926,7 @@
               <a:rPr lang="en-AU" sz="2400" dirty="0">
                 <a:latin typeface="Courier" pitchFamily="2" charset="0"/>
               </a:rPr>
-              <a:t>intersect, </a:t>
-            </a:r>
-            <a:r>
-              <a:rPr lang="en-AU" sz="2400" dirty="0" err="1">
-                <a:latin typeface="Courier" pitchFamily="2" charset="0"/>
-              </a:rPr>
-              <a:t>setdiff</a:t>
-            </a:r>
-            <a:r>
-              <a:rPr lang="en-AU" sz="2400" dirty="0">
-                <a:latin typeface="Courier" pitchFamily="2" charset="0"/>
-              </a:rPr>
-              <a:t> </a:t>
+              <a:t>intersect, setdiff </a:t>
             </a:r>
             <a:r>
               <a:rPr lang="en-AU" sz="2400" dirty="0"/>
@@ -5217,10 +5143,9 @@
           <a:lstStyle/>
           <a:p>
             <a:r>
-              <a:rPr lang="en-AU"/>
+              <a:rPr lang="en-AU" dirty="0"/>
               <a:t>recap</a:t>
             </a:r>
-            <a:endParaRPr lang="en-AU" dirty="0"/>
           </a:p>
         </p:txBody>
       </p:sp>
@@ -5253,7 +5178,7 @@
           <a:lstStyle/>
           <a:p>
             <a:r>
-              <a:rPr lang="en-AU" sz="2800" b="1" dirty="0" err="1">
+              <a:rPr lang="en-AU" sz="2800" b="1" dirty="0">
                 <a:latin typeface="Courier" pitchFamily="2" charset="0"/>
               </a:rPr>
               <a:t>pivot_longer</a:t>
@@ -5276,16 +5201,10 @@
               <a:t>x = </a:t>
             </a:r>
             <a:r>
-              <a:rPr lang="en-AU" sz="2600" dirty="0" err="1">
-                <a:latin typeface="Courier" pitchFamily="2" charset="0"/>
-              </a:rPr>
-              <a:t>dataframe</a:t>
-            </a:r>
-            <a:r>
               <a:rPr lang="en-AU" sz="2600" dirty="0">
                 <a:latin typeface="Courier" pitchFamily="2" charset="0"/>
               </a:rPr>
-              <a:t>, </a:t>
+              <a:t>data frame, </a:t>
             </a:r>
             <a:br>
               <a:rPr lang="en-AU" sz="2600" dirty="0">
@@ -5310,34 +5229,16 @@
               </a:rPr>
             </a:br>
             <a:r>
-              <a:rPr lang="en-AU" sz="2600" b="1" dirty="0" err="1">
-                <a:latin typeface="Courier" pitchFamily="2" charset="0"/>
-              </a:rPr>
-              <a:t>names_to</a:t>
-            </a:r>
-            <a:r>
               <a:rPr lang="en-AU" sz="2600" b="1" dirty="0">
                 <a:latin typeface="Courier" pitchFamily="2" charset="0"/>
               </a:rPr>
-              <a:t>=</a:t>
+              <a:t>names_to=</a:t>
             </a:r>
             <a:r>
               <a:rPr lang="en-AU" sz="2600" dirty="0">
                 <a:latin typeface="Courier" pitchFamily="2" charset="0"/>
               </a:rPr>
-              <a:t>n </a:t>
-            </a:r>
-            <a:r>
-              <a:rPr lang="en-AU" sz="2600" dirty="0" err="1">
-                <a:latin typeface="Courier" pitchFamily="2" charset="0"/>
-              </a:rPr>
-              <a:t>ew</a:t>
-            </a:r>
-            <a:r>
-              <a:rPr lang="en-AU" sz="2600" dirty="0">
-                <a:latin typeface="Courier" pitchFamily="2" charset="0"/>
-              </a:rPr>
-              <a:t> column name, </a:t>
+              <a:t>new column name, </a:t>
             </a:r>
             <a:br>
               <a:rPr lang="en-AU" sz="2600" dirty="0">
@@ -5345,16 +5246,10 @@
               </a:rPr>
             </a:br>
             <a:r>
-              <a:rPr lang="en-AU" sz="2600" b="1" dirty="0" err="1">
-                <a:latin typeface="Courier" pitchFamily="2" charset="0"/>
-              </a:rPr>
-              <a:t>values_to</a:t>
-            </a:r>
-            <a:r>
               <a:rPr lang="en-AU" sz="2600" b="1" dirty="0">
                 <a:latin typeface="Courier" pitchFamily="2" charset="0"/>
               </a:rPr>
-              <a:t> = </a:t>
+              <a:t>values_to = </a:t>
             </a:r>
             <a:r>
               <a:rPr lang="en-AU" sz="2600" dirty="0">
@@ -5379,7 +5274,7 @@
           </a:p>
           <a:p>
             <a:r>
-              <a:rPr lang="en-AU" sz="2800" b="1" dirty="0" err="1">
+              <a:rPr lang="en-AU" sz="2800" b="1" dirty="0">
                 <a:latin typeface="Courier" pitchFamily="2" charset="0"/>
               </a:rPr>
               <a:t>pivot_wider</a:t>
@@ -5402,16 +5297,10 @@
               <a:t>x= </a:t>
             </a:r>
             <a:r>
-              <a:rPr lang="en-AU" sz="2600" dirty="0" err="1">
-                <a:latin typeface="Courier" pitchFamily="2" charset="0"/>
-              </a:rPr>
-              <a:t>dataframe</a:t>
-            </a:r>
-            <a:r>
               <a:rPr lang="en-AU" sz="2600" dirty="0">
                 <a:latin typeface="Courier" pitchFamily="2" charset="0"/>
               </a:rPr>
-              <a:t>, </a:t>
+              <a:t>data frame, </a:t>
             </a:r>
             <a:br>
               <a:rPr lang="en-AU" sz="2600" dirty="0">
@@ -5419,16 +5308,10 @@
               </a:rPr>
             </a:br>
             <a:r>
-              <a:rPr lang="en-AU" sz="2600" b="1" dirty="0" err="1">
-                <a:latin typeface="Courier" pitchFamily="2" charset="0"/>
-              </a:rPr>
-              <a:t>names_from</a:t>
-            </a:r>
-            <a:r>
               <a:rPr lang="en-AU" sz="2600" b="1" dirty="0">
                 <a:latin typeface="Courier" pitchFamily="2" charset="0"/>
               </a:rPr>
-              <a:t>= </a:t>
+              <a:t>names_from= </a:t>
             </a:r>
             <a:r>
               <a:rPr lang="en-AU" sz="2600" dirty="0">
@@ -5442,16 +5325,10 @@
               </a:rPr>
             </a:br>
             <a:r>
-              <a:rPr lang="en-AU" sz="2600" b="1" dirty="0" err="1">
-                <a:latin typeface="Courier" pitchFamily="2" charset="0"/>
-              </a:rPr>
-              <a:t>values_from</a:t>
-            </a:r>
-            <a:r>
               <a:rPr lang="en-AU" sz="2600" b="1" dirty="0">
                 <a:latin typeface="Courier" pitchFamily="2" charset="0"/>
               </a:rPr>
-              <a:t>= </a:t>
+              <a:t>values_from= </a:t>
             </a:r>
             <a:r>
               <a:rPr lang="en-AU" sz="2600" dirty="0">
@@ -5667,10 +5544,9 @@
           <a:lstStyle/>
           <a:p>
             <a:r>
-              <a:rPr lang="en-AU"/>
+              <a:rPr lang="en-AU" dirty="0"/>
               <a:t>recap</a:t>
             </a:r>
-            <a:endParaRPr lang="en-AU" dirty="0"/>
           </a:p>
         </p:txBody>
       </p:sp>
@@ -5748,28 +5624,16 @@
               </a:rPr>
             </a:br>
             <a:r>
-              <a:rPr lang="en-AU" sz="2400" b="1" dirty="0" err="1">
-                <a:latin typeface="Courier" pitchFamily="2" charset="0"/>
-              </a:rPr>
-              <a:t>sep</a:t>
-            </a:r>
-            <a:r>
               <a:rPr lang="en-AU" sz="2400" b="1" dirty="0">
                 <a:latin typeface="Courier" pitchFamily="2" charset="0"/>
               </a:rPr>
-              <a:t>= </a:t>
-            </a:r>
-            <a:r>
-              <a:rPr lang="en-AU" sz="2400" dirty="0" err="1">
-                <a:latin typeface="Courier" pitchFamily="2" charset="0"/>
-              </a:rPr>
-              <a:t>separatpr</a:t>
+              <a:t>sep= </a:t>
             </a:r>
             <a:r>
               <a:rPr lang="en-AU" sz="2400" dirty="0">
                 <a:latin typeface="Courier" pitchFamily="2" charset="0"/>
               </a:rPr>
-              <a:t> character,</a:t>
+              <a:t>separator character,</a:t>
             </a:r>
             <a:br>
               <a:rPr lang="en-AU" sz="2400" b="1" dirty="0">
@@ -5842,22 +5706,16 @@
               </a:rPr>
             </a:br>
             <a:r>
-              <a:rPr lang="en-AU" sz="2400" b="1" dirty="0" err="1">
-                <a:latin typeface="Courier" pitchFamily="2" charset="0"/>
-              </a:rPr>
-              <a:t>sep</a:t>
-            </a:r>
-            <a:r>
               <a:rPr lang="en-AU" sz="2400" b="1" dirty="0">
                 <a:latin typeface="Courier" pitchFamily="2" charset="0"/>
               </a:rPr>
-              <a:t>= </a:t>
+              <a:t>sep= </a:t>
             </a:r>
             <a:r>
               <a:rPr lang="en-AU" sz="2400" dirty="0">
                 <a:latin typeface="Courier" pitchFamily="2" charset="0"/>
               </a:rPr>
-              <a:t>delimiter to pit between columns</a:t>
+              <a:t>delimiter to put between columns</a:t>
             </a:r>
             <a:r>
               <a:rPr lang="en-AU" sz="2400" b="1" dirty="0">
@@ -6055,10 +5913,9 @@
           <a:lstStyle/>
           <a:p>
             <a:r>
-              <a:rPr lang="en-AU"/>
+              <a:rPr lang="en-AU" dirty="0"/>
               <a:t>recap</a:t>
             </a:r>
-            <a:endParaRPr lang="en-AU" dirty="0"/>
           </a:p>
         </p:txBody>
       </p:sp>
@@ -6142,16 +5999,10 @@
               <a:t>by=</a:t>
             </a:r>
             <a:r>
-              <a:rPr lang="en-AU" sz="2800" dirty="0" err="1">
-                <a:latin typeface="Courier" pitchFamily="2" charset="0"/>
-              </a:rPr>
-              <a:t>col_name</a:t>
-            </a:r>
-            <a:r>
               <a:rPr lang="en-AU" sz="2800" dirty="0">
                 <a:latin typeface="Courier" pitchFamily="2" charset="0"/>
               </a:rPr>
-              <a:t> or c(col_1, col_2) or</a:t>
+              <a:t>col_name or c(col_1, col_2) or</a:t>
             </a:r>
             <a:br>
               <a:rPr lang="en-AU" sz="2800" dirty="0">
@@ -6168,25 +6019,7 @@
               <a:rPr lang="en-AU" sz="2800" dirty="0">
                 <a:latin typeface="Courier" pitchFamily="2" charset="0"/>
               </a:rPr>
-              <a:t>x = </a:t>
-            </a:r>
-            <a:r>
-              <a:rPr lang="en-AU" sz="2800" dirty="0" err="1">
-                <a:latin typeface="Courier" pitchFamily="2" charset="0"/>
-              </a:rPr>
-              <a:t>grouping_var_x</a:t>
-            </a:r>
-            <a:r>
-              <a:rPr lang="en-AU" sz="2800" dirty="0">
-                <a:latin typeface="Courier" pitchFamily="2" charset="0"/>
-              </a:rPr>
-              <a:t> &amp; y = </a:t>
-            </a:r>
-            <a:r>
-              <a:rPr lang="en-AU" sz="2800" dirty="0" err="1">
-                <a:latin typeface="Courier" pitchFamily="2" charset="0"/>
-              </a:rPr>
-              <a:t>grouping_var_y</a:t>
+              <a:t>x = grouping_var_x &amp; y = grouping_var_y</a:t>
             </a:r>
             <a:r>
               <a:rPr lang="en-AU" sz="2800" b="1" dirty="0">
@@ -6489,12 +6322,8 @@
               <a:buNone/>
             </a:pPr>
             <a:r>
-              <a:rPr lang="en-AU" b="1" dirty="0" err="1"/>
-              <a:t>left_join</a:t>
-            </a:r>
-            <a:r>
               <a:rPr lang="en-AU" b="1" dirty="0"/>
-              <a:t>()</a:t>
+              <a:t>left_join()</a:t>
             </a:r>
           </a:p>
           <a:p>
@@ -6514,12 +6343,8 @@
               <a:buNone/>
             </a:pPr>
             <a:r>
-              <a:rPr lang="en-AU" b="1" dirty="0" err="1"/>
-              <a:t>right_join</a:t>
-            </a:r>
-            <a:r>
               <a:rPr lang="en-AU" b="1" dirty="0"/>
-              <a:t>()</a:t>
+              <a:t>right_join()</a:t>
             </a:r>
           </a:p>
           <a:p>
@@ -6539,12 +6364,8 @@
               <a:buNone/>
             </a:pPr>
             <a:r>
-              <a:rPr lang="en-AU" b="1" dirty="0" err="1"/>
-              <a:t>inner_join</a:t>
-            </a:r>
-            <a:r>
               <a:rPr lang="en-AU" b="1" dirty="0"/>
-              <a:t>()</a:t>
+              <a:t>inner_join()</a:t>
             </a:r>
           </a:p>
           <a:p>
@@ -6564,12 +6385,8 @@
               <a:buNone/>
             </a:pPr>
             <a:r>
-              <a:rPr lang="en-AU" b="1" dirty="0" err="1"/>
-              <a:t>full_join</a:t>
-            </a:r>
-            <a:r>
               <a:rPr lang="en-AU" b="1" dirty="0"/>
-              <a:t>()</a:t>
+              <a:t>full_join()</a:t>
             </a:r>
           </a:p>
           <a:p>
@@ -6736,10 +6553,9 @@
           <a:lstStyle/>
           <a:p>
             <a:r>
-              <a:rPr lang="en-AU"/>
+              <a:rPr lang="en-AU" dirty="0"/>
               <a:t>A few more join functions</a:t>
             </a:r>
-            <a:endParaRPr lang="en-AU" dirty="0"/>
           </a:p>
         </p:txBody>
       </p:sp>
@@ -6792,16 +6608,10 @@
           </a:p>
           <a:p>
             <a:r>
-              <a:rPr lang="en-AU" sz="2400" b="1" dirty="0" err="1">
-                <a:latin typeface="Courier" pitchFamily="2" charset="0"/>
-              </a:rPr>
-              <a:t>semi_join</a:t>
-            </a:r>
-            <a:r>
               <a:rPr lang="en-AU" sz="2400" b="1" dirty="0">
                 <a:latin typeface="Courier" pitchFamily="2" charset="0"/>
               </a:rPr>
-              <a:t> (x, y, by=) </a:t>
+              <a:t>semi_join (x, y, by=) </a:t>
             </a:r>
             <a:r>
               <a:rPr lang="en-AU" sz="2400" dirty="0">
@@ -6822,16 +6632,10 @@
           </a:p>
           <a:p>
             <a:r>
-              <a:rPr lang="en-AU" sz="2400" b="1" dirty="0" err="1">
-                <a:latin typeface="Courier" pitchFamily="2" charset="0"/>
-              </a:rPr>
-              <a:t>anti_join</a:t>
-            </a:r>
-            <a:r>
               <a:rPr lang="en-AU" sz="2400" b="1" dirty="0">
                 <a:latin typeface="Courier" pitchFamily="2" charset="0"/>
               </a:rPr>
-              <a:t> (x, y, by=) </a:t>
+              <a:t>anti_join (x, y, by=) </a:t>
             </a:r>
             <a:r>
               <a:rPr lang="en-AU" sz="2400" dirty="0">
@@ -6993,7 +6797,7 @@
           <a:lstStyle/>
           <a:p>
             <a:pPr algn="ctr"/>
-            <a:endParaRPr lang="en-AU"/>
+            <a:endParaRPr lang="en-AU" dirty="0"/>
           </a:p>
         </p:txBody>
       </p:sp>
@@ -7049,10 +6853,9 @@
           <a:lstStyle/>
           <a:p>
             <a:r>
-              <a:rPr lang="en-AU"/>
+              <a:rPr lang="en-AU" dirty="0"/>
               <a:t>A few more join functions</a:t>
             </a:r>
-            <a:endParaRPr lang="en-AU" dirty="0"/>
           </a:p>
         </p:txBody>
       </p:sp>
@@ -7105,16 +6908,10 @@
           </a:p>
           <a:p>
             <a:r>
-              <a:rPr lang="en-AU" sz="2400" b="1" dirty="0" err="1">
-                <a:latin typeface="Courier" pitchFamily="2" charset="0"/>
-              </a:rPr>
-              <a:t>semi_join</a:t>
-            </a:r>
-            <a:r>
               <a:rPr lang="en-AU" sz="2400" b="1" dirty="0">
                 <a:latin typeface="Courier" pitchFamily="2" charset="0"/>
               </a:rPr>
-              <a:t> (x, y, by=) </a:t>
+              <a:t>semi_join (x, y, by=) </a:t>
             </a:r>
             <a:r>
               <a:rPr lang="en-AU" sz="2400" dirty="0">
@@ -7135,16 +6932,10 @@
           </a:p>
           <a:p>
             <a:r>
-              <a:rPr lang="en-AU" sz="2400" b="1" dirty="0" err="1">
-                <a:latin typeface="Courier" pitchFamily="2" charset="0"/>
-              </a:rPr>
-              <a:t>anti_join</a:t>
-            </a:r>
-            <a:r>
               <a:rPr lang="en-AU" sz="2400" b="1" dirty="0">
                 <a:latin typeface="Courier" pitchFamily="2" charset="0"/>
               </a:rPr>
-              <a:t> (x, y, by=) </a:t>
+              <a:t>anti_join (x, y, by=) </a:t>
             </a:r>
             <a:r>
               <a:rPr lang="en-AU" sz="2400" dirty="0">
@@ -7306,7 +7097,7 @@
           <a:lstStyle/>
           <a:p>
             <a:pPr algn="ctr"/>
-            <a:endParaRPr lang="en-AU"/>
+            <a:endParaRPr lang="en-AU" dirty="0"/>
           </a:p>
         </p:txBody>
       </p:sp>
@@ -7362,10 +7153,9 @@
           <a:lstStyle/>
           <a:p>
             <a:r>
-              <a:rPr lang="en-AU"/>
+              <a:rPr lang="en-AU" dirty="0"/>
               <a:t>A few more join functions</a:t>
             </a:r>
-            <a:endParaRPr lang="en-AU" dirty="0"/>
           </a:p>
         </p:txBody>
       </p:sp>
@@ -7418,16 +7208,10 @@
           </a:p>
           <a:p>
             <a:r>
-              <a:rPr lang="en-AU" sz="2400" b="1" dirty="0" err="1">
-                <a:latin typeface="Courier" pitchFamily="2" charset="0"/>
-              </a:rPr>
-              <a:t>semi_join</a:t>
-            </a:r>
-            <a:r>
               <a:rPr lang="en-AU" sz="2400" b="1" dirty="0">
                 <a:latin typeface="Courier" pitchFamily="2" charset="0"/>
               </a:rPr>
-              <a:t> (x, y, by=) </a:t>
+              <a:t>semi_join (x, y, by=) </a:t>
             </a:r>
             <a:r>
               <a:rPr lang="en-AU" sz="2400" dirty="0">
@@ -7448,16 +7232,10 @@
           </a:p>
           <a:p>
             <a:r>
-              <a:rPr lang="en-AU" sz="2400" b="1" dirty="0" err="1">
-                <a:latin typeface="Courier" pitchFamily="2" charset="0"/>
-              </a:rPr>
-              <a:t>anti_join</a:t>
-            </a:r>
-            <a:r>
               <a:rPr lang="en-AU" sz="2400" b="1" dirty="0">
                 <a:latin typeface="Courier" pitchFamily="2" charset="0"/>
               </a:rPr>
-              <a:t> (x, y, by=) </a:t>
+              <a:t>anti_join (x, y, by=) </a:t>
             </a:r>
             <a:r>
               <a:rPr lang="en-AU" sz="2400" dirty="0">

</xml_diff>